<commit_message>
added slides to power point
</commit_message>
<xml_diff>
--- a/The 8 Tile Puzzle.pptx
+++ b/The 8 Tile Puzzle.pptx
@@ -10,8 +10,9 @@
     <p:sldId id="258" r:id="rId4"/>
     <p:sldId id="259" r:id="rId5"/>
     <p:sldId id="260" r:id="rId6"/>
-    <p:sldId id="262" r:id="rId7"/>
-    <p:sldId id="261" r:id="rId8"/>
+    <p:sldId id="261" r:id="rId7"/>
+    <p:sldId id="262" r:id="rId8"/>
+    <p:sldId id="263" r:id="rId9"/>
   </p:sldIdLst>
   <p:sldSz cx="12192000" cy="6858000"/>
   <p:notesSz cx="6858000" cy="9144000"/>
@@ -110,6 +111,11 @@
       </a:defRPr>
     </a:lvl9pPr>
   </p:defaultTextStyle>
+  <p:extLst>
+    <p:ext uri="{EFAFB233-063F-42B5-8137-9DF3F51BA10A}">
+      <p15:sldGuideLst xmlns:p15="http://schemas.microsoft.com/office/powerpoint/2012/main"/>
+    </p:ext>
+  </p:extLst>
 </p:presentation>
 </file>
 
@@ -155,10 +161,9 @@
           </a:lstStyle>
           <a:p>
             <a:r>
-              <a:rPr lang="en-US" smtClean="0"/>
+              <a:rPr lang="en-US"/>
               <a:t>Click to edit Master title style</a:t>
             </a:r>
-            <a:endParaRPr lang="en-US"/>
           </a:p>
         </p:txBody>
       </p:sp>
@@ -220,10 +225,9 @@
           </a:lstStyle>
           <a:p>
             <a:r>
-              <a:rPr lang="en-US" smtClean="0"/>
+              <a:rPr lang="en-US"/>
               <a:t>Click to edit Master subtitle style</a:t>
             </a:r>
-            <a:endParaRPr lang="en-US"/>
           </a:p>
         </p:txBody>
       </p:sp>
@@ -244,7 +248,7 @@
           <a:p>
             <a:fld id="{ECA17286-218A-4459-B49B-FCA301423E9D}" type="datetimeFigureOut">
               <a:rPr lang="en-US" smtClean="0"/>
-              <a:t>5/8/2018</a:t>
+              <a:t>5/9/18</a:t>
             </a:fld>
             <a:endParaRPr lang="en-US"/>
           </a:p>
@@ -338,10 +342,9 @@
           <a:lstStyle/>
           <a:p>
             <a:r>
-              <a:rPr lang="en-US" smtClean="0"/>
+              <a:rPr lang="en-US"/>
               <a:t>Click to edit Master title style</a:t>
             </a:r>
-            <a:endParaRPr lang="en-US"/>
           </a:p>
         </p:txBody>
       </p:sp>
@@ -362,38 +365,37 @@
           <a:p>
             <a:pPr lvl="0"/>
             <a:r>
-              <a:rPr lang="en-US" smtClean="0"/>
+              <a:rPr lang="en-US"/>
               <a:t>Edit Master text styles</a:t>
             </a:r>
           </a:p>
           <a:p>
             <a:pPr lvl="1"/>
             <a:r>
-              <a:rPr lang="en-US" smtClean="0"/>
+              <a:rPr lang="en-US"/>
               <a:t>Second level</a:t>
             </a:r>
           </a:p>
           <a:p>
             <a:pPr lvl="2"/>
             <a:r>
-              <a:rPr lang="en-US" smtClean="0"/>
+              <a:rPr lang="en-US"/>
               <a:t>Third level</a:t>
             </a:r>
           </a:p>
           <a:p>
             <a:pPr lvl="3"/>
             <a:r>
-              <a:rPr lang="en-US" smtClean="0"/>
+              <a:rPr lang="en-US"/>
               <a:t>Fourth level</a:t>
             </a:r>
           </a:p>
           <a:p>
             <a:pPr lvl="4"/>
             <a:r>
-              <a:rPr lang="en-US" smtClean="0"/>
+              <a:rPr lang="en-US"/>
               <a:t>Fifth level</a:t>
             </a:r>
-            <a:endParaRPr lang="en-US"/>
           </a:p>
         </p:txBody>
       </p:sp>
@@ -414,7 +416,7 @@
           <a:p>
             <a:fld id="{ECA17286-218A-4459-B49B-FCA301423E9D}" type="datetimeFigureOut">
               <a:rPr lang="en-US" smtClean="0"/>
-              <a:t>5/8/2018</a:t>
+              <a:t>5/9/18</a:t>
             </a:fld>
             <a:endParaRPr lang="en-US"/>
           </a:p>
@@ -513,10 +515,9 @@
           <a:lstStyle/>
           <a:p>
             <a:r>
-              <a:rPr lang="en-US" smtClean="0"/>
+              <a:rPr lang="en-US"/>
               <a:t>Click to edit Master title style</a:t>
             </a:r>
-            <a:endParaRPr lang="en-US"/>
           </a:p>
         </p:txBody>
       </p:sp>
@@ -542,38 +543,37 @@
           <a:p>
             <a:pPr lvl="0"/>
             <a:r>
-              <a:rPr lang="en-US" smtClean="0"/>
+              <a:rPr lang="en-US"/>
               <a:t>Edit Master text styles</a:t>
             </a:r>
           </a:p>
           <a:p>
             <a:pPr lvl="1"/>
             <a:r>
-              <a:rPr lang="en-US" smtClean="0"/>
+              <a:rPr lang="en-US"/>
               <a:t>Second level</a:t>
             </a:r>
           </a:p>
           <a:p>
             <a:pPr lvl="2"/>
             <a:r>
-              <a:rPr lang="en-US" smtClean="0"/>
+              <a:rPr lang="en-US"/>
               <a:t>Third level</a:t>
             </a:r>
           </a:p>
           <a:p>
             <a:pPr lvl="3"/>
             <a:r>
-              <a:rPr lang="en-US" smtClean="0"/>
+              <a:rPr lang="en-US"/>
               <a:t>Fourth level</a:t>
             </a:r>
           </a:p>
           <a:p>
             <a:pPr lvl="4"/>
             <a:r>
-              <a:rPr lang="en-US" smtClean="0"/>
+              <a:rPr lang="en-US"/>
               <a:t>Fifth level</a:t>
             </a:r>
-            <a:endParaRPr lang="en-US"/>
           </a:p>
         </p:txBody>
       </p:sp>
@@ -594,7 +594,7 @@
           <a:p>
             <a:fld id="{ECA17286-218A-4459-B49B-FCA301423E9D}" type="datetimeFigureOut">
               <a:rPr lang="en-US" smtClean="0"/>
-              <a:t>5/8/2018</a:t>
+              <a:t>5/9/18</a:t>
             </a:fld>
             <a:endParaRPr lang="en-US"/>
           </a:p>
@@ -688,10 +688,9 @@
           <a:lstStyle/>
           <a:p>
             <a:r>
-              <a:rPr lang="en-US" smtClean="0"/>
+              <a:rPr lang="en-US"/>
               <a:t>Click to edit Master title style</a:t>
             </a:r>
-            <a:endParaRPr lang="en-US"/>
           </a:p>
         </p:txBody>
       </p:sp>
@@ -712,38 +711,37 @@
           <a:p>
             <a:pPr lvl="0"/>
             <a:r>
-              <a:rPr lang="en-US" smtClean="0"/>
+              <a:rPr lang="en-US"/>
               <a:t>Edit Master text styles</a:t>
             </a:r>
           </a:p>
           <a:p>
             <a:pPr lvl="1"/>
             <a:r>
-              <a:rPr lang="en-US" smtClean="0"/>
+              <a:rPr lang="en-US"/>
               <a:t>Second level</a:t>
             </a:r>
           </a:p>
           <a:p>
             <a:pPr lvl="2"/>
             <a:r>
-              <a:rPr lang="en-US" smtClean="0"/>
+              <a:rPr lang="en-US"/>
               <a:t>Third level</a:t>
             </a:r>
           </a:p>
           <a:p>
             <a:pPr lvl="3"/>
             <a:r>
-              <a:rPr lang="en-US" smtClean="0"/>
+              <a:rPr lang="en-US"/>
               <a:t>Fourth level</a:t>
             </a:r>
           </a:p>
           <a:p>
             <a:pPr lvl="4"/>
             <a:r>
-              <a:rPr lang="en-US" smtClean="0"/>
+              <a:rPr lang="en-US"/>
               <a:t>Fifth level</a:t>
             </a:r>
-            <a:endParaRPr lang="en-US"/>
           </a:p>
         </p:txBody>
       </p:sp>
@@ -764,7 +762,7 @@
           <a:p>
             <a:fld id="{ECA17286-218A-4459-B49B-FCA301423E9D}" type="datetimeFigureOut">
               <a:rPr lang="en-US" smtClean="0"/>
-              <a:t>5/8/2018</a:t>
+              <a:t>5/9/18</a:t>
             </a:fld>
             <a:endParaRPr lang="en-US"/>
           </a:p>
@@ -867,10 +865,9 @@
           </a:lstStyle>
           <a:p>
             <a:r>
-              <a:rPr lang="en-US" smtClean="0"/>
+              <a:rPr lang="en-US"/>
               <a:t>Click to edit Master title style</a:t>
             </a:r>
-            <a:endParaRPr lang="en-US"/>
           </a:p>
         </p:txBody>
       </p:sp>
@@ -987,7 +984,7 @@
           <a:p>
             <a:pPr lvl="0"/>
             <a:r>
-              <a:rPr lang="en-US" smtClean="0"/>
+              <a:rPr lang="en-US"/>
               <a:t>Edit Master text styles</a:t>
             </a:r>
           </a:p>
@@ -1010,7 +1007,7 @@
           <a:p>
             <a:fld id="{ECA17286-218A-4459-B49B-FCA301423E9D}" type="datetimeFigureOut">
               <a:rPr lang="en-US" smtClean="0"/>
-              <a:t>5/8/2018</a:t>
+              <a:t>5/9/18</a:t>
             </a:fld>
             <a:endParaRPr lang="en-US"/>
           </a:p>
@@ -1104,10 +1101,9 @@
           <a:lstStyle/>
           <a:p>
             <a:r>
-              <a:rPr lang="en-US" smtClean="0"/>
+              <a:rPr lang="en-US"/>
               <a:t>Click to edit Master title style</a:t>
             </a:r>
-            <a:endParaRPr lang="en-US"/>
           </a:p>
         </p:txBody>
       </p:sp>
@@ -1133,38 +1129,37 @@
           <a:p>
             <a:pPr lvl="0"/>
             <a:r>
-              <a:rPr lang="en-US" smtClean="0"/>
+              <a:rPr lang="en-US"/>
               <a:t>Edit Master text styles</a:t>
             </a:r>
           </a:p>
           <a:p>
             <a:pPr lvl="1"/>
             <a:r>
-              <a:rPr lang="en-US" smtClean="0"/>
+              <a:rPr lang="en-US"/>
               <a:t>Second level</a:t>
             </a:r>
           </a:p>
           <a:p>
             <a:pPr lvl="2"/>
             <a:r>
-              <a:rPr lang="en-US" smtClean="0"/>
+              <a:rPr lang="en-US"/>
               <a:t>Third level</a:t>
             </a:r>
           </a:p>
           <a:p>
             <a:pPr lvl="3"/>
             <a:r>
-              <a:rPr lang="en-US" smtClean="0"/>
+              <a:rPr lang="en-US"/>
               <a:t>Fourth level</a:t>
             </a:r>
           </a:p>
           <a:p>
             <a:pPr lvl="4"/>
             <a:r>
-              <a:rPr lang="en-US" smtClean="0"/>
+              <a:rPr lang="en-US"/>
               <a:t>Fifth level</a:t>
             </a:r>
-            <a:endParaRPr lang="en-US"/>
           </a:p>
         </p:txBody>
       </p:sp>
@@ -1190,38 +1185,37 @@
           <a:p>
             <a:pPr lvl="0"/>
             <a:r>
-              <a:rPr lang="en-US" smtClean="0"/>
+              <a:rPr lang="en-US"/>
               <a:t>Edit Master text styles</a:t>
             </a:r>
           </a:p>
           <a:p>
             <a:pPr lvl="1"/>
             <a:r>
-              <a:rPr lang="en-US" smtClean="0"/>
+              <a:rPr lang="en-US"/>
               <a:t>Second level</a:t>
             </a:r>
           </a:p>
           <a:p>
             <a:pPr lvl="2"/>
             <a:r>
-              <a:rPr lang="en-US" smtClean="0"/>
+              <a:rPr lang="en-US"/>
               <a:t>Third level</a:t>
             </a:r>
           </a:p>
           <a:p>
             <a:pPr lvl="3"/>
             <a:r>
-              <a:rPr lang="en-US" smtClean="0"/>
+              <a:rPr lang="en-US"/>
               <a:t>Fourth level</a:t>
             </a:r>
           </a:p>
           <a:p>
             <a:pPr lvl="4"/>
             <a:r>
-              <a:rPr lang="en-US" smtClean="0"/>
+              <a:rPr lang="en-US"/>
               <a:t>Fifth level</a:t>
             </a:r>
-            <a:endParaRPr lang="en-US"/>
           </a:p>
         </p:txBody>
       </p:sp>
@@ -1242,7 +1236,7 @@
           <a:p>
             <a:fld id="{ECA17286-218A-4459-B49B-FCA301423E9D}" type="datetimeFigureOut">
               <a:rPr lang="en-US" smtClean="0"/>
-              <a:t>5/8/2018</a:t>
+              <a:t>5/9/18</a:t>
             </a:fld>
             <a:endParaRPr lang="en-US"/>
           </a:p>
@@ -1341,10 +1335,9 @@
           <a:lstStyle/>
           <a:p>
             <a:r>
-              <a:rPr lang="en-US" smtClean="0"/>
+              <a:rPr lang="en-US"/>
               <a:t>Click to edit Master title style</a:t>
             </a:r>
-            <a:endParaRPr lang="en-US"/>
           </a:p>
         </p:txBody>
       </p:sp>
@@ -1407,7 +1400,7 @@
           <a:p>
             <a:pPr lvl="0"/>
             <a:r>
-              <a:rPr lang="en-US" smtClean="0"/>
+              <a:rPr lang="en-US"/>
               <a:t>Edit Master text styles</a:t>
             </a:r>
           </a:p>
@@ -1435,38 +1428,37 @@
           <a:p>
             <a:pPr lvl="0"/>
             <a:r>
-              <a:rPr lang="en-US" smtClean="0"/>
+              <a:rPr lang="en-US"/>
               <a:t>Edit Master text styles</a:t>
             </a:r>
           </a:p>
           <a:p>
             <a:pPr lvl="1"/>
             <a:r>
-              <a:rPr lang="en-US" smtClean="0"/>
+              <a:rPr lang="en-US"/>
               <a:t>Second level</a:t>
             </a:r>
           </a:p>
           <a:p>
             <a:pPr lvl="2"/>
             <a:r>
-              <a:rPr lang="en-US" smtClean="0"/>
+              <a:rPr lang="en-US"/>
               <a:t>Third level</a:t>
             </a:r>
           </a:p>
           <a:p>
             <a:pPr lvl="3"/>
             <a:r>
-              <a:rPr lang="en-US" smtClean="0"/>
+              <a:rPr lang="en-US"/>
               <a:t>Fourth level</a:t>
             </a:r>
           </a:p>
           <a:p>
             <a:pPr lvl="4"/>
             <a:r>
-              <a:rPr lang="en-US" smtClean="0"/>
+              <a:rPr lang="en-US"/>
               <a:t>Fifth level</a:t>
             </a:r>
-            <a:endParaRPr lang="en-US"/>
           </a:p>
         </p:txBody>
       </p:sp>
@@ -1529,7 +1521,7 @@
           <a:p>
             <a:pPr lvl="0"/>
             <a:r>
-              <a:rPr lang="en-US" smtClean="0"/>
+              <a:rPr lang="en-US"/>
               <a:t>Edit Master text styles</a:t>
             </a:r>
           </a:p>
@@ -1557,38 +1549,37 @@
           <a:p>
             <a:pPr lvl="0"/>
             <a:r>
-              <a:rPr lang="en-US" smtClean="0"/>
+              <a:rPr lang="en-US"/>
               <a:t>Edit Master text styles</a:t>
             </a:r>
           </a:p>
           <a:p>
             <a:pPr lvl="1"/>
             <a:r>
-              <a:rPr lang="en-US" smtClean="0"/>
+              <a:rPr lang="en-US"/>
               <a:t>Second level</a:t>
             </a:r>
           </a:p>
           <a:p>
             <a:pPr lvl="2"/>
             <a:r>
-              <a:rPr lang="en-US" smtClean="0"/>
+              <a:rPr lang="en-US"/>
               <a:t>Third level</a:t>
             </a:r>
           </a:p>
           <a:p>
             <a:pPr lvl="3"/>
             <a:r>
-              <a:rPr lang="en-US" smtClean="0"/>
+              <a:rPr lang="en-US"/>
               <a:t>Fourth level</a:t>
             </a:r>
           </a:p>
           <a:p>
             <a:pPr lvl="4"/>
             <a:r>
-              <a:rPr lang="en-US" smtClean="0"/>
+              <a:rPr lang="en-US"/>
               <a:t>Fifth level</a:t>
             </a:r>
-            <a:endParaRPr lang="en-US"/>
           </a:p>
         </p:txBody>
       </p:sp>
@@ -1609,7 +1600,7 @@
           <a:p>
             <a:fld id="{ECA17286-218A-4459-B49B-FCA301423E9D}" type="datetimeFigureOut">
               <a:rPr lang="en-US" smtClean="0"/>
-              <a:t>5/8/2018</a:t>
+              <a:t>5/9/18</a:t>
             </a:fld>
             <a:endParaRPr lang="en-US"/>
           </a:p>
@@ -1703,10 +1694,9 @@
           <a:lstStyle/>
           <a:p>
             <a:r>
-              <a:rPr lang="en-US" smtClean="0"/>
+              <a:rPr lang="en-US"/>
               <a:t>Click to edit Master title style</a:t>
             </a:r>
-            <a:endParaRPr lang="en-US"/>
           </a:p>
         </p:txBody>
       </p:sp>
@@ -1727,7 +1717,7 @@
           <a:p>
             <a:fld id="{ECA17286-218A-4459-B49B-FCA301423E9D}" type="datetimeFigureOut">
               <a:rPr lang="en-US" smtClean="0"/>
-              <a:t>5/8/2018</a:t>
+              <a:t>5/9/18</a:t>
             </a:fld>
             <a:endParaRPr lang="en-US"/>
           </a:p>
@@ -1822,7 +1812,7 @@
           <a:p>
             <a:fld id="{ECA17286-218A-4459-B49B-FCA301423E9D}" type="datetimeFigureOut">
               <a:rPr lang="en-US" smtClean="0"/>
-              <a:t>5/8/2018</a:t>
+              <a:t>5/9/18</a:t>
             </a:fld>
             <a:endParaRPr lang="en-US"/>
           </a:p>
@@ -1925,10 +1915,9 @@
           </a:lstStyle>
           <a:p>
             <a:r>
-              <a:rPr lang="en-US" smtClean="0"/>
+              <a:rPr lang="en-US"/>
               <a:t>Click to edit Master title style</a:t>
             </a:r>
-            <a:endParaRPr lang="en-US"/>
           </a:p>
         </p:txBody>
       </p:sp>
@@ -1982,38 +1971,37 @@
           <a:p>
             <a:pPr lvl="0"/>
             <a:r>
-              <a:rPr lang="en-US" smtClean="0"/>
+              <a:rPr lang="en-US"/>
               <a:t>Edit Master text styles</a:t>
             </a:r>
           </a:p>
           <a:p>
             <a:pPr lvl="1"/>
             <a:r>
-              <a:rPr lang="en-US" smtClean="0"/>
+              <a:rPr lang="en-US"/>
               <a:t>Second level</a:t>
             </a:r>
           </a:p>
           <a:p>
             <a:pPr lvl="2"/>
             <a:r>
-              <a:rPr lang="en-US" smtClean="0"/>
+              <a:rPr lang="en-US"/>
               <a:t>Third level</a:t>
             </a:r>
           </a:p>
           <a:p>
             <a:pPr lvl="3"/>
             <a:r>
-              <a:rPr lang="en-US" smtClean="0"/>
+              <a:rPr lang="en-US"/>
               <a:t>Fourth level</a:t>
             </a:r>
           </a:p>
           <a:p>
             <a:pPr lvl="4"/>
             <a:r>
-              <a:rPr lang="en-US" smtClean="0"/>
+              <a:rPr lang="en-US"/>
               <a:t>Fifth level</a:t>
             </a:r>
-            <a:endParaRPr lang="en-US"/>
           </a:p>
         </p:txBody>
       </p:sp>
@@ -2076,7 +2064,7 @@
           <a:p>
             <a:pPr lvl="0"/>
             <a:r>
-              <a:rPr lang="en-US" smtClean="0"/>
+              <a:rPr lang="en-US"/>
               <a:t>Edit Master text styles</a:t>
             </a:r>
           </a:p>
@@ -2099,7 +2087,7 @@
           <a:p>
             <a:fld id="{ECA17286-218A-4459-B49B-FCA301423E9D}" type="datetimeFigureOut">
               <a:rPr lang="en-US" smtClean="0"/>
-              <a:t>5/8/2018</a:t>
+              <a:t>5/9/18</a:t>
             </a:fld>
             <a:endParaRPr lang="en-US"/>
           </a:p>
@@ -2202,10 +2190,9 @@
           </a:lstStyle>
           <a:p>
             <a:r>
-              <a:rPr lang="en-US" smtClean="0"/>
+              <a:rPr lang="en-US"/>
               <a:t>Click to edit Master title style</a:t>
             </a:r>
-            <a:endParaRPr lang="en-US"/>
           </a:p>
         </p:txBody>
       </p:sp>
@@ -2329,7 +2316,7 @@
           <a:p>
             <a:pPr lvl="0"/>
             <a:r>
-              <a:rPr lang="en-US" smtClean="0"/>
+              <a:rPr lang="en-US"/>
               <a:t>Edit Master text styles</a:t>
             </a:r>
           </a:p>
@@ -2352,7 +2339,7 @@
           <a:p>
             <a:fld id="{ECA17286-218A-4459-B49B-FCA301423E9D}" type="datetimeFigureOut">
               <a:rPr lang="en-US" smtClean="0"/>
-              <a:t>5/8/2018</a:t>
+              <a:t>5/9/18</a:t>
             </a:fld>
             <a:endParaRPr lang="en-US"/>
           </a:p>
@@ -2461,10 +2448,9 @@
           <a:lstStyle/>
           <a:p>
             <a:r>
-              <a:rPr lang="en-US" smtClean="0"/>
+              <a:rPr lang="en-US"/>
               <a:t>Click to edit Master title style</a:t>
             </a:r>
-            <a:endParaRPr lang="en-US"/>
           </a:p>
         </p:txBody>
       </p:sp>
@@ -2495,38 +2481,37 @@
           <a:p>
             <a:pPr lvl="0"/>
             <a:r>
-              <a:rPr lang="en-US" smtClean="0"/>
+              <a:rPr lang="en-US"/>
               <a:t>Edit Master text styles</a:t>
             </a:r>
           </a:p>
           <a:p>
             <a:pPr lvl="1"/>
             <a:r>
-              <a:rPr lang="en-US" smtClean="0"/>
+              <a:rPr lang="en-US"/>
               <a:t>Second level</a:t>
             </a:r>
           </a:p>
           <a:p>
             <a:pPr lvl="2"/>
             <a:r>
-              <a:rPr lang="en-US" smtClean="0"/>
+              <a:rPr lang="en-US"/>
               <a:t>Third level</a:t>
             </a:r>
           </a:p>
           <a:p>
             <a:pPr lvl="3"/>
             <a:r>
-              <a:rPr lang="en-US" smtClean="0"/>
+              <a:rPr lang="en-US"/>
               <a:t>Fourth level</a:t>
             </a:r>
           </a:p>
           <a:p>
             <a:pPr lvl="4"/>
             <a:r>
-              <a:rPr lang="en-US" smtClean="0"/>
+              <a:rPr lang="en-US"/>
               <a:t>Fifth level</a:t>
             </a:r>
-            <a:endParaRPr lang="en-US"/>
           </a:p>
         </p:txBody>
       </p:sp>
@@ -2565,7 +2550,7 @@
           <a:p>
             <a:fld id="{ECA17286-218A-4459-B49B-FCA301423E9D}" type="datetimeFigureOut">
               <a:rPr lang="en-US" smtClean="0"/>
-              <a:t>5/8/2018</a:t>
+              <a:t>5/9/18</a:t>
             </a:fld>
             <a:endParaRPr lang="en-US"/>
           </a:p>
@@ -2986,10 +2971,9 @@
           <a:lstStyle/>
           <a:p>
             <a:r>
-              <a:rPr lang="en-US" dirty="0" smtClean="0"/>
+              <a:rPr lang="en-US" dirty="0"/>
               <a:t>The 8 Tile Puzzle</a:t>
             </a:r>
-            <a:endParaRPr lang="en-US" dirty="0"/>
           </a:p>
         </p:txBody>
       </p:sp>
@@ -3009,10 +2993,9 @@
           <a:lstStyle/>
           <a:p>
             <a:r>
-              <a:rPr lang="en-US" dirty="0" smtClean="0"/>
+              <a:rPr lang="en-US" dirty="0"/>
               <a:t>An Exercise in Reinforcement Learning!</a:t>
             </a:r>
-            <a:endParaRPr lang="en-US" dirty="0"/>
           </a:p>
         </p:txBody>
       </p:sp>
@@ -3062,10 +3045,9 @@
           <a:lstStyle/>
           <a:p>
             <a:r>
-              <a:rPr lang="en-US" dirty="0" smtClean="0"/>
+              <a:rPr lang="en-US" dirty="0"/>
               <a:t>The basics of the game</a:t>
             </a:r>
-            <a:endParaRPr lang="en-US" dirty="0"/>
           </a:p>
         </p:txBody>
       </p:sp>
@@ -3085,19 +3067,19 @@
           <a:lstStyle/>
           <a:p>
             <a:r>
-              <a:rPr lang="en-US" dirty="0" smtClean="0"/>
+              <a:rPr lang="en-US" dirty="0"/>
               <a:t>3x3 game board containing tiles 1 through 8 and an empty space.</a:t>
             </a:r>
           </a:p>
           <a:p>
             <a:r>
-              <a:rPr lang="en-US" dirty="0" smtClean="0"/>
+              <a:rPr lang="en-US" dirty="0"/>
               <a:t>Only the tiles adjacent to the empty space are movable. </a:t>
             </a:r>
           </a:p>
           <a:p>
             <a:r>
-              <a:rPr lang="en-US" dirty="0" smtClean="0"/>
+              <a:rPr lang="en-US" dirty="0"/>
               <a:t>The goal of the game is to organize the tiles such that they look like the picture on the right below.</a:t>
             </a:r>
           </a:p>
@@ -3179,10 +3161,9 @@
           <a:lstStyle/>
           <a:p>
             <a:r>
-              <a:rPr lang="en-US" dirty="0" smtClean="0"/>
+              <a:rPr lang="en-US" dirty="0"/>
               <a:t>Conceptualizing the problem</a:t>
             </a:r>
-            <a:endParaRPr lang="en-US" dirty="0"/>
           </a:p>
         </p:txBody>
       </p:sp>
@@ -3202,28 +3183,27 @@
           <a:lstStyle/>
           <a:p>
             <a:r>
-              <a:rPr lang="en-US" dirty="0" smtClean="0"/>
+              <a:rPr lang="en-US" dirty="0"/>
               <a:t>Create a matrix as the representation of the game board at all times.</a:t>
             </a:r>
           </a:p>
           <a:p>
             <a:r>
-              <a:rPr lang="en-US" dirty="0" smtClean="0"/>
+              <a:rPr lang="en-US" dirty="0"/>
               <a:t>8 tile game has 4 possible moves at most- up, down, left, right. Often the empty space will be bordered by the boundary of the game space and only have 2 or 3 possible moves.</a:t>
             </a:r>
           </a:p>
           <a:p>
             <a:r>
-              <a:rPr lang="en-US" dirty="0" smtClean="0"/>
+              <a:rPr lang="en-US" dirty="0"/>
               <a:t>The search tree for the 8 tile game has its starting node as the initial puzzle to be solved, and the successors are the possible moves that can be performed given the game board.</a:t>
             </a:r>
           </a:p>
           <a:p>
             <a:r>
-              <a:rPr lang="en-US" dirty="0" smtClean="0"/>
+              <a:rPr lang="en-US" dirty="0"/>
               <a:t>Not too different from the Pacman project overall</a:t>
             </a:r>
-            <a:endParaRPr lang="en-US" dirty="0"/>
           </a:p>
         </p:txBody>
       </p:sp>
@@ -3273,10 +3253,9 @@
           <a:lstStyle/>
           <a:p>
             <a:r>
-              <a:rPr lang="en-US" dirty="0" smtClean="0"/>
+              <a:rPr lang="en-US" dirty="0"/>
               <a:t>Types of Search &amp; Search Tree</a:t>
             </a:r>
-            <a:endParaRPr lang="en-US" dirty="0"/>
           </a:p>
         </p:txBody>
       </p:sp>
@@ -3296,48 +3275,48 @@
           <a:lstStyle/>
           <a:p>
             <a:r>
-              <a:rPr lang="en-US" dirty="0" smtClean="0"/>
+              <a:rPr lang="en-US" dirty="0"/>
               <a:t>Goal of the project is to implement an 8 tile puzzle solver that can solve search tree with DFS, BFS, UCS, A*. </a:t>
             </a:r>
           </a:p>
           <a:p>
             <a:r>
-              <a:rPr lang="en-US" dirty="0" smtClean="0"/>
+              <a:rPr lang="en-US" dirty="0"/>
               <a:t>Search tree for 8 tile puzzle can be surprisingly complex- not very difficult to create a puzzle that needs to expand thousands of nodes to find goal state. </a:t>
             </a:r>
           </a:p>
           <a:p>
             <a:r>
-              <a:rPr lang="en-US" dirty="0" smtClean="0"/>
+              <a:rPr lang="en-US" dirty="0"/>
               <a:t>For the cost of each node, our program takes the</a:t>
             </a:r>
             <a:br>
-              <a:rPr lang="en-US" dirty="0" smtClean="0"/>
+              <a:rPr lang="en-US" dirty="0"/>
             </a:br>
             <a:r>
-              <a:rPr lang="en-US" dirty="0" smtClean="0"/>
+              <a:rPr lang="en-US" dirty="0"/>
               <a:t>depth of the puzzle as its cost. The heuristic used for A*</a:t>
             </a:r>
             <a:br>
-              <a:rPr lang="en-US" dirty="0" smtClean="0"/>
+              <a:rPr lang="en-US" dirty="0"/>
             </a:br>
             <a:r>
-              <a:rPr lang="en-US" dirty="0" smtClean="0"/>
+              <a:rPr lang="en-US" dirty="0"/>
               <a:t>search is the </a:t>
             </a:r>
             <a:r>
-              <a:rPr lang="en-US" dirty="0" err="1" smtClean="0"/>
+              <a:rPr lang="en-US" dirty="0" err="1"/>
               <a:t>manhattan</a:t>
             </a:r>
             <a:r>
-              <a:rPr lang="en-US" dirty="0" smtClean="0"/>
+              <a:rPr lang="en-US" dirty="0"/>
               <a:t> distance of a tile from its </a:t>
             </a:r>
             <a:br>
-              <a:rPr lang="en-US" dirty="0" smtClean="0"/>
+              <a:rPr lang="en-US" dirty="0"/>
             </a:br>
             <a:r>
-              <a:rPr lang="en-US" dirty="0" smtClean="0"/>
+              <a:rPr lang="en-US" dirty="0"/>
               <a:t>current location to its goal location.</a:t>
             </a:r>
           </a:p>
@@ -3419,10 +3398,9 @@
           <a:lstStyle/>
           <a:p>
             <a:r>
-              <a:rPr lang="en-US" dirty="0" smtClean="0"/>
+              <a:rPr lang="en-US" dirty="0"/>
               <a:t>Puzzle expansion order</a:t>
             </a:r>
-            <a:endParaRPr lang="en-US" dirty="0"/>
           </a:p>
         </p:txBody>
       </p:sp>
@@ -3449,80 +3427,79 @@
           <a:lstStyle/>
           <a:p>
             <a:r>
-              <a:rPr lang="en-US" dirty="0" smtClean="0"/>
+              <a:rPr lang="en-US" dirty="0"/>
               <a:t>The order in which the possible</a:t>
             </a:r>
             <a:br>
-              <a:rPr lang="en-US" dirty="0" smtClean="0"/>
+              <a:rPr lang="en-US" dirty="0"/>
             </a:br>
             <a:r>
-              <a:rPr lang="en-US" dirty="0" smtClean="0"/>
+              <a:rPr lang="en-US" dirty="0"/>
               <a:t>successor puzzles are processed</a:t>
             </a:r>
             <a:br>
-              <a:rPr lang="en-US" dirty="0" smtClean="0"/>
+              <a:rPr lang="en-US" dirty="0"/>
             </a:br>
             <a:r>
-              <a:rPr lang="en-US" dirty="0" smtClean="0"/>
+              <a:rPr lang="en-US" dirty="0"/>
               <a:t>has huge implications on which</a:t>
             </a:r>
             <a:br>
-              <a:rPr lang="en-US" dirty="0" smtClean="0"/>
+              <a:rPr lang="en-US" dirty="0"/>
             </a:br>
             <a:r>
-              <a:rPr lang="en-US" dirty="0" smtClean="0"/>
+              <a:rPr lang="en-US" dirty="0"/>
               <a:t>algorithm between DFS or BFS will</a:t>
             </a:r>
             <a:br>
-              <a:rPr lang="en-US" dirty="0" smtClean="0"/>
+              <a:rPr lang="en-US" dirty="0"/>
             </a:br>
             <a:r>
-              <a:rPr lang="en-US" dirty="0" smtClean="0"/>
+              <a:rPr lang="en-US" dirty="0"/>
               <a:t>be more efficient at solving the puzzle. </a:t>
             </a:r>
           </a:p>
           <a:p>
             <a:r>
-              <a:rPr lang="en-US" dirty="0" smtClean="0"/>
+              <a:rPr lang="en-US" dirty="0"/>
               <a:t>In our program’s case, the order in which the puzzles are appended is as follows; move empty space </a:t>
             </a:r>
             <a:r>
-              <a:rPr lang="en-US" b="1" dirty="0" smtClean="0"/>
+              <a:rPr lang="en-US" b="1" dirty="0"/>
               <a:t>left</a:t>
             </a:r>
             <a:r>
-              <a:rPr lang="en-US" dirty="0" smtClean="0"/>
+              <a:rPr lang="en-US" dirty="0"/>
               <a:t>, move empty space </a:t>
             </a:r>
             <a:r>
-              <a:rPr lang="en-US" b="1" dirty="0" smtClean="0"/>
+              <a:rPr lang="en-US" b="1" dirty="0"/>
               <a:t>down</a:t>
             </a:r>
             <a:r>
-              <a:rPr lang="en-US" dirty="0" smtClean="0"/>
+              <a:rPr lang="en-US" dirty="0"/>
               <a:t>, </a:t>
             </a:r>
             <a:r>
-              <a:rPr lang="en-US" b="1" dirty="0" smtClean="0"/>
+              <a:rPr lang="en-US" b="1" dirty="0"/>
               <a:t>right</a:t>
             </a:r>
             <a:r>
-              <a:rPr lang="en-US" dirty="0" smtClean="0"/>
+              <a:rPr lang="en-US" dirty="0"/>
               <a:t>, then </a:t>
             </a:r>
             <a:r>
-              <a:rPr lang="en-US" b="1" dirty="0" smtClean="0"/>
+              <a:rPr lang="en-US" b="1" dirty="0"/>
               <a:t>up</a:t>
             </a:r>
             <a:r>
-              <a:rPr lang="en-US" dirty="0" smtClean="0"/>
+              <a:rPr lang="en-US" dirty="0"/>
               <a:t>. </a:t>
             </a:r>
-            <a:endParaRPr lang="en-US" dirty="0"/>
-          </a:p>
-          <a:p>
-            <a:r>
-              <a:rPr lang="en-US" dirty="0" smtClean="0"/>
+          </a:p>
+          <a:p>
+            <a:r>
+              <a:rPr lang="en-US" dirty="0"/>
               <a:t>A maximum of four nodes can be created per each parent puzzle node, which leads to an exponential increase in nodes to expand.</a:t>
             </a:r>
           </a:p>
@@ -3598,10 +3575,9 @@
           <a:lstStyle/>
           <a:p>
             <a:r>
-              <a:rPr lang="en-US" dirty="0" smtClean="0"/>
-              <a:t>	</a:t>
-            </a:r>
-            <a:endParaRPr lang="en-US" dirty="0"/>
+              <a:rPr lang="en-US" dirty="0"/>
+              <a:t>Current Solution	</a:t>
+            </a:r>
           </a:p>
         </p:txBody>
       </p:sp>
@@ -3620,14 +3596,98 @@
           <a:bodyPr/>
           <a:lstStyle/>
           <a:p>
-            <a:endParaRPr lang="en-US"/>
-          </a:p>
-        </p:txBody>
-      </p:sp>
+            <a:r>
+              <a:rPr lang="en-US" dirty="0"/>
+              <a:t>Every search algorithm is run </a:t>
+            </a:r>
+          </a:p>
+          <a:p>
+            <a:pPr marL="0" indent="0">
+              <a:buNone/>
+            </a:pPr>
+            <a:r>
+              <a:rPr lang="en-US" dirty="0"/>
+              <a:t>through solve method</a:t>
+            </a:r>
+          </a:p>
+          <a:p>
+            <a:r>
+              <a:rPr lang="en-US" dirty="0"/>
+              <a:t>We utilize various data Structures for different</a:t>
+            </a:r>
+          </a:p>
+          <a:p>
+            <a:pPr marL="0" indent="0">
+              <a:buNone/>
+            </a:pPr>
+            <a:r>
+              <a:rPr lang="en-US" dirty="0"/>
+              <a:t>Searches(Stack, Priority Queue, etc.)</a:t>
+            </a:r>
+          </a:p>
+          <a:p>
+            <a:r>
+              <a:rPr lang="en-US" dirty="0"/>
+              <a:t>A* search utilizes Manhattan Distance as heuristic</a:t>
+            </a:r>
+          </a:p>
+          <a:p>
+            <a:r>
+              <a:rPr lang="en-US" dirty="0"/>
+              <a:t>Currently UCS and BFS are equal to each other, </a:t>
+            </a:r>
+          </a:p>
+          <a:p>
+            <a:pPr marL="0" indent="0">
+              <a:buNone/>
+            </a:pPr>
+            <a:r>
+              <a:rPr lang="en-US" dirty="0"/>
+              <a:t>since we are using constant cost for every move</a:t>
+            </a:r>
+          </a:p>
+        </p:txBody>
+      </p:sp>
+      <p:pic>
+        <p:nvPicPr>
+          <p:cNvPr id="5" name="Picture 4">
+            <a:extLst>
+              <a:ext uri="{FF2B5EF4-FFF2-40B4-BE49-F238E27FC236}">
+                <a16:creationId xmlns:a16="http://schemas.microsoft.com/office/drawing/2014/main" id="{E971659D-B88B-5040-8F21-A7B73B133B3C}"/>
+              </a:ext>
+            </a:extLst>
+          </p:cNvPr>
+          <p:cNvPicPr>
+            <a:picLocks noChangeAspect="1"/>
+          </p:cNvPicPr>
+          <p:nvPr/>
+        </p:nvPicPr>
+        <p:blipFill>
+          <a:blip r:embed="rId2">
+            <a:extLst>
+              <a:ext uri="{28A0092B-C50C-407E-A947-70E740481C1C}">
+                <a14:useLocalDpi xmlns:a14="http://schemas.microsoft.com/office/drawing/2010/main" val="0"/>
+              </a:ext>
+            </a:extLst>
+          </a:blip>
+          <a:stretch>
+            <a:fillRect/>
+          </a:stretch>
+        </p:blipFill>
+        <p:spPr>
+          <a:xfrm>
+            <a:off x="8365067" y="0"/>
+            <a:ext cx="3826933" cy="5429956"/>
+          </a:xfrm>
+          <a:prstGeom prst="rect">
+            <a:avLst/>
+          </a:prstGeom>
+        </p:spPr>
+      </p:pic>
     </p:spTree>
     <p:extLst>
       <p:ext uri="{BB962C8B-B14F-4D97-AF65-F5344CB8AC3E}">
-        <p14:creationId xmlns:p14="http://schemas.microsoft.com/office/powerpoint/2010/main" val="2109722782"/>
+        <p14:creationId xmlns:p14="http://schemas.microsoft.com/office/powerpoint/2010/main" val="3694581912"/>
       </p:ext>
     </p:extLst>
   </p:cSld>
@@ -3656,7 +3716,13 @@
       </p:grpSpPr>
       <p:sp>
         <p:nvSpPr>
-          <p:cNvPr id="2" name="Title 1"/>
+          <p:cNvPr id="2" name="Title 1">
+            <a:extLst>
+              <a:ext uri="{FF2B5EF4-FFF2-40B4-BE49-F238E27FC236}">
+                <a16:creationId xmlns:a16="http://schemas.microsoft.com/office/drawing/2014/main" id="{D45FB6DB-F914-BA45-813C-8570CC85B332}"/>
+              </a:ext>
+            </a:extLst>
+          </p:cNvPr>
           <p:cNvSpPr>
             <a:spLocks noGrp="1"/>
           </p:cNvSpPr>
@@ -3669,13 +3735,22 @@
           <a:bodyPr/>
           <a:lstStyle/>
           <a:p>
-            <a:endParaRPr lang="en-US"/>
-          </a:p>
-        </p:txBody>
-      </p:sp>
-      <p:sp>
-        <p:nvSpPr>
-          <p:cNvPr id="3" name="Content Placeholder 2"/>
+            <a:r>
+              <a:rPr lang="en-US" dirty="0"/>
+              <a:t>Current Issue</a:t>
+            </a:r>
+          </a:p>
+        </p:txBody>
+      </p:sp>
+      <p:sp>
+        <p:nvSpPr>
+          <p:cNvPr id="3" name="Content Placeholder 2">
+            <a:extLst>
+              <a:ext uri="{FF2B5EF4-FFF2-40B4-BE49-F238E27FC236}">
+                <a16:creationId xmlns:a16="http://schemas.microsoft.com/office/drawing/2014/main" id="{17F2BBB3-1BA5-1248-BB31-451018EEC30E}"/>
+              </a:ext>
+            </a:extLst>
+          </p:cNvPr>
           <p:cNvSpPr>
             <a:spLocks noGrp="1"/>
           </p:cNvSpPr>
@@ -3688,14 +3763,227 @@
           <a:bodyPr/>
           <a:lstStyle/>
           <a:p>
-            <a:endParaRPr lang="en-US"/>
-          </a:p>
-        </p:txBody>
-      </p:sp>
+            <a:r>
+              <a:rPr lang="en-US" dirty="0"/>
+              <a:t>After implementing BFS and A* searches </a:t>
+            </a:r>
+          </a:p>
+          <a:p>
+            <a:pPr marL="0" indent="0">
+              <a:buNone/>
+            </a:pPr>
+            <a:r>
+              <a:rPr lang="en-US" dirty="0"/>
+              <a:t>We ran into problem with DFS.</a:t>
+            </a:r>
+          </a:p>
+          <a:p>
+            <a:r>
+              <a:rPr lang="en-US" dirty="0"/>
+              <a:t>Depending on the board set up it might solve the problem.</a:t>
+            </a:r>
+          </a:p>
+          <a:p>
+            <a:pPr marL="0" indent="0">
+              <a:buNone/>
+            </a:pPr>
+            <a:endParaRPr lang="en-US" dirty="0"/>
+          </a:p>
+          <a:p>
+            <a:r>
+              <a:rPr lang="en-US" dirty="0"/>
+              <a:t>However in some cases DFS takes either too long to compute the </a:t>
+            </a:r>
+          </a:p>
+          <a:p>
+            <a:pPr marL="0" indent="0">
+              <a:buNone/>
+            </a:pPr>
+            <a:r>
+              <a:rPr lang="en-US" dirty="0"/>
+              <a:t>solution or even crashes the program.</a:t>
+            </a:r>
+          </a:p>
+        </p:txBody>
+      </p:sp>
+      <p:pic>
+        <p:nvPicPr>
+          <p:cNvPr id="5" name="Picture 4">
+            <a:extLst>
+              <a:ext uri="{FF2B5EF4-FFF2-40B4-BE49-F238E27FC236}">
+                <a16:creationId xmlns:a16="http://schemas.microsoft.com/office/drawing/2014/main" id="{C1A0CEFB-24B2-7440-9CB7-41CC16D6896E}"/>
+              </a:ext>
+            </a:extLst>
+          </p:cNvPr>
+          <p:cNvPicPr>
+            <a:picLocks noChangeAspect="1"/>
+          </p:cNvPicPr>
+          <p:nvPr/>
+        </p:nvPicPr>
+        <p:blipFill>
+          <a:blip r:embed="rId2">
+            <a:extLst>
+              <a:ext uri="{28A0092B-C50C-407E-A947-70E740481C1C}">
+                <a14:useLocalDpi xmlns:a14="http://schemas.microsoft.com/office/drawing/2010/main" val="0"/>
+              </a:ext>
+            </a:extLst>
+          </a:blip>
+          <a:stretch>
+            <a:fillRect/>
+          </a:stretch>
+        </p:blipFill>
+        <p:spPr>
+          <a:xfrm>
+            <a:off x="1239291" y="3364087"/>
+            <a:ext cx="4856709" cy="370035"/>
+          </a:xfrm>
+          <a:prstGeom prst="rect">
+            <a:avLst/>
+          </a:prstGeom>
+        </p:spPr>
+      </p:pic>
+      <p:pic>
+        <p:nvPicPr>
+          <p:cNvPr id="7" name="Picture 6">
+            <a:extLst>
+              <a:ext uri="{FF2B5EF4-FFF2-40B4-BE49-F238E27FC236}">
+                <a16:creationId xmlns:a16="http://schemas.microsoft.com/office/drawing/2014/main" id="{EAFCABC4-4DB4-5245-802E-0B809D85A943}"/>
+              </a:ext>
+            </a:extLst>
+          </p:cNvPr>
+          <p:cNvPicPr>
+            <a:picLocks noChangeAspect="1"/>
+          </p:cNvPicPr>
+          <p:nvPr/>
+        </p:nvPicPr>
+        <p:blipFill>
+          <a:blip r:embed="rId3">
+            <a:extLst>
+              <a:ext uri="{28A0092B-C50C-407E-A947-70E740481C1C}">
+                <a14:useLocalDpi xmlns:a14="http://schemas.microsoft.com/office/drawing/2010/main" val="0"/>
+              </a:ext>
+            </a:extLst>
+          </a:blip>
+          <a:stretch>
+            <a:fillRect/>
+          </a:stretch>
+        </p:blipFill>
+        <p:spPr>
+          <a:xfrm>
+            <a:off x="1153045" y="4904284"/>
+            <a:ext cx="5029200" cy="368300"/>
+          </a:xfrm>
+          <a:prstGeom prst="rect">
+            <a:avLst/>
+          </a:prstGeom>
+        </p:spPr>
+      </p:pic>
     </p:spTree>
     <p:extLst>
       <p:ext uri="{BB962C8B-B14F-4D97-AF65-F5344CB8AC3E}">
-        <p14:creationId xmlns:p14="http://schemas.microsoft.com/office/powerpoint/2010/main" val="3694581912"/>
+        <p14:creationId xmlns:p14="http://schemas.microsoft.com/office/powerpoint/2010/main" val="1992265978"/>
+      </p:ext>
+    </p:extLst>
+  </p:cSld>
+  <p:clrMapOvr>
+    <a:masterClrMapping/>
+  </p:clrMapOvr>
+</p:sld>
+</file>
+
+<file path=ppt/slides/slide8.xml><?xml version="1.0" encoding="utf-8"?>
+<p:sld xmlns:a="http://schemas.openxmlformats.org/drawingml/2006/main" xmlns:r="http://schemas.openxmlformats.org/officeDocument/2006/relationships" xmlns:p="http://schemas.openxmlformats.org/presentationml/2006/main">
+  <p:cSld>
+    <p:spTree>
+      <p:nvGrpSpPr>
+        <p:cNvPr id="1" name=""/>
+        <p:cNvGrpSpPr/>
+        <p:nvPr/>
+      </p:nvGrpSpPr>
+      <p:grpSpPr>
+        <a:xfrm>
+          <a:off x="0" y="0"/>
+          <a:ext cx="0" cy="0"/>
+          <a:chOff x="0" y="0"/>
+          <a:chExt cx="0" cy="0"/>
+        </a:xfrm>
+      </p:grpSpPr>
+      <p:sp>
+        <p:nvSpPr>
+          <p:cNvPr id="2" name="Title 1">
+            <a:extLst>
+              <a:ext uri="{FF2B5EF4-FFF2-40B4-BE49-F238E27FC236}">
+                <a16:creationId xmlns:a16="http://schemas.microsoft.com/office/drawing/2014/main" id="{348AC271-ADE3-3147-899C-71E1A0E0ED0D}"/>
+              </a:ext>
+            </a:extLst>
+          </p:cNvPr>
+          <p:cNvSpPr>
+            <a:spLocks noGrp="1"/>
+          </p:cNvSpPr>
+          <p:nvPr>
+            <p:ph type="title"/>
+          </p:nvPr>
+        </p:nvSpPr>
+        <p:spPr/>
+        <p:txBody>
+          <a:bodyPr/>
+          <a:lstStyle/>
+          <a:p>
+            <a:r>
+              <a:rPr lang="en-US" dirty="0"/>
+              <a:t>Conclusion	</a:t>
+            </a:r>
+          </a:p>
+        </p:txBody>
+      </p:sp>
+      <p:sp>
+        <p:nvSpPr>
+          <p:cNvPr id="3" name="Content Placeholder 2">
+            <a:extLst>
+              <a:ext uri="{FF2B5EF4-FFF2-40B4-BE49-F238E27FC236}">
+                <a16:creationId xmlns:a16="http://schemas.microsoft.com/office/drawing/2014/main" id="{0DAAD913-A8B2-7646-9735-1F72E65D5443}"/>
+              </a:ext>
+            </a:extLst>
+          </p:cNvPr>
+          <p:cNvSpPr>
+            <a:spLocks noGrp="1"/>
+          </p:cNvSpPr>
+          <p:nvPr>
+            <p:ph idx="1"/>
+          </p:nvPr>
+        </p:nvSpPr>
+        <p:spPr/>
+        <p:txBody>
+          <a:bodyPr/>
+          <a:lstStyle/>
+          <a:p>
+            <a:r>
+              <a:rPr lang="en-US" dirty="0"/>
+              <a:t>In the majority of test A* proves to be the most effective way to reach the solution.</a:t>
+            </a:r>
+          </a:p>
+          <a:p>
+            <a:r>
+              <a:rPr lang="en-US" dirty="0"/>
+              <a:t>BFS and UCS are the second as expected</a:t>
+            </a:r>
+          </a:p>
+          <a:p>
+            <a:r>
+              <a:rPr lang="en-US" dirty="0"/>
+              <a:t>With DFS we need to investigate more if the Algorithm is very inefficient or we haven’t implemented </a:t>
+            </a:r>
+            <a:r>
+              <a:rPr lang="en-US"/>
+              <a:t>it correctly.</a:t>
+            </a:r>
+          </a:p>
+        </p:txBody>
+      </p:sp>
+    </p:spTree>
+    <p:extLst>
+      <p:ext uri="{BB962C8B-B14F-4D97-AF65-F5344CB8AC3E}">
+        <p14:creationId xmlns:p14="http://schemas.microsoft.com/office/powerpoint/2010/main" val="3331882732"/>
       </p:ext>
     </p:extLst>
   </p:cSld>

</xml_diff>